<commit_message>
added rnn experiment results
</commit_message>
<xml_diff>
--- a/Presentation Slides/Visibility Learning - RNN.pptx
+++ b/Presentation Slides/Visibility Learning - RNN.pptx
@@ -5,7 +5,7 @@
     <p:sldMasterId id="2147483719" r:id="rId1"/>
   </p:sldMasterIdLst>
   <p:notesMasterIdLst>
-    <p:notesMasterId r:id="rId7"/>
+    <p:notesMasterId r:id="rId8"/>
   </p:notesMasterIdLst>
   <p:sldIdLst>
     <p:sldId id="256" r:id="rId2"/>
@@ -13,6 +13,7 @@
     <p:sldId id="334" r:id="rId4"/>
     <p:sldId id="333" r:id="rId5"/>
     <p:sldId id="332" r:id="rId6"/>
+    <p:sldId id="335" r:id="rId7"/>
   </p:sldIdLst>
   <p:sldSz cx="12192000" cy="6858000"/>
   <p:notesSz cx="6858000" cy="9144000"/>
@@ -201,7 +202,7 @@
           <a:p>
             <a:fld id="{6BCA0D92-46D6-46DB-ABC1-1AE9DB7BBC52}" type="datetimeFigureOut">
               <a:rPr lang="en-US" smtClean="0"/>
-              <a:t>1/1/2025</a:t>
+              <a:t>1/2/2025</a:t>
             </a:fld>
             <a:endParaRPr lang="en-US"/>
           </a:p>
@@ -871,7 +872,7 @@
           <a:p>
             <a:fld id="{4275735D-F34F-4430-8EBF-F60F5DB0360D}" type="datetimeFigureOut">
               <a:rPr lang="en-US" smtClean="0"/>
-              <a:t>1/1/2025</a:t>
+              <a:t>1/2/2025</a:t>
             </a:fld>
             <a:endParaRPr lang="en-US"/>
           </a:p>
@@ -1050,7 +1051,7 @@
           <a:p>
             <a:fld id="{4275735D-F34F-4430-8EBF-F60F5DB0360D}" type="datetimeFigureOut">
               <a:rPr lang="en-US" smtClean="0"/>
-              <a:t>1/1/2025</a:t>
+              <a:t>1/2/2025</a:t>
             </a:fld>
             <a:endParaRPr lang="en-US"/>
           </a:p>
@@ -1230,7 +1231,7 @@
           <a:p>
             <a:fld id="{4275735D-F34F-4430-8EBF-F60F5DB0360D}" type="datetimeFigureOut">
               <a:rPr lang="en-US" smtClean="0"/>
-              <a:t>1/1/2025</a:t>
+              <a:t>1/2/2025</a:t>
             </a:fld>
             <a:endParaRPr lang="en-US"/>
           </a:p>
@@ -1400,7 +1401,7 @@
           <a:p>
             <a:fld id="{4275735D-F34F-4430-8EBF-F60F5DB0360D}" type="datetimeFigureOut">
               <a:rPr lang="en-US" smtClean="0"/>
-              <a:t>1/1/2025</a:t>
+              <a:t>1/2/2025</a:t>
             </a:fld>
             <a:endParaRPr lang="en-US"/>
           </a:p>
@@ -1713,7 +1714,7 @@
           <a:p>
             <a:fld id="{4275735D-F34F-4430-8EBF-F60F5DB0360D}" type="datetimeFigureOut">
               <a:rPr lang="en-US" smtClean="0"/>
-              <a:t>1/1/2025</a:t>
+              <a:t>1/2/2025</a:t>
             </a:fld>
             <a:endParaRPr lang="en-US"/>
           </a:p>
@@ -2099,7 +2100,7 @@
           <a:p>
             <a:fld id="{4275735D-F34F-4430-8EBF-F60F5DB0360D}" type="datetimeFigureOut">
               <a:rPr lang="en-US" smtClean="0"/>
-              <a:t>1/1/2025</a:t>
+              <a:t>1/2/2025</a:t>
             </a:fld>
             <a:endParaRPr lang="en-US"/>
           </a:p>
@@ -2533,7 +2534,7 @@
           <a:p>
             <a:fld id="{4275735D-F34F-4430-8EBF-F60F5DB0360D}" type="datetimeFigureOut">
               <a:rPr lang="en-US" smtClean="0"/>
-              <a:t>1/1/2025</a:t>
+              <a:t>1/2/2025</a:t>
             </a:fld>
             <a:endParaRPr lang="en-US"/>
           </a:p>
@@ -2651,7 +2652,7 @@
           <a:p>
             <a:fld id="{4275735D-F34F-4430-8EBF-F60F5DB0360D}" type="datetimeFigureOut">
               <a:rPr lang="en-US" smtClean="0"/>
-              <a:t>1/1/2025</a:t>
+              <a:t>1/2/2025</a:t>
             </a:fld>
             <a:endParaRPr lang="en-US"/>
           </a:p>
@@ -2746,7 +2747,7 @@
           <a:p>
             <a:fld id="{4275735D-F34F-4430-8EBF-F60F5DB0360D}" type="datetimeFigureOut">
               <a:rPr lang="en-US" smtClean="0"/>
-              <a:t>1/1/2025</a:t>
+              <a:t>1/2/2025</a:t>
             </a:fld>
             <a:endParaRPr lang="en-US"/>
           </a:p>
@@ -3096,7 +3097,7 @@
           <a:p>
             <a:fld id="{4275735D-F34F-4430-8EBF-F60F5DB0360D}" type="datetimeFigureOut">
               <a:rPr lang="en-US" smtClean="0"/>
-              <a:t>1/1/2025</a:t>
+              <a:t>1/2/2025</a:t>
             </a:fld>
             <a:endParaRPr lang="en-US"/>
           </a:p>
@@ -3521,7 +3522,7 @@
           <a:p>
             <a:fld id="{4275735D-F34F-4430-8EBF-F60F5DB0360D}" type="datetimeFigureOut">
               <a:rPr lang="en-US" smtClean="0"/>
-              <a:t>1/1/2025</a:t>
+              <a:t>1/2/2025</a:t>
             </a:fld>
             <a:endParaRPr lang="en-US"/>
           </a:p>
@@ -3802,7 +3803,7 @@
           <a:p>
             <a:fld id="{4275735D-F34F-4430-8EBF-F60F5DB0360D}" type="datetimeFigureOut">
               <a:rPr lang="en-US" smtClean="0"/>
-              <a:t>1/1/2025</a:t>
+              <a:t>1/2/2025</a:t>
             </a:fld>
             <a:endParaRPr lang="en-US"/>
           </a:p>
@@ -5002,7 +5003,7 @@
         <p:spPr>
           <a:xfrm>
             <a:off x="1198129" y="1070791"/>
-            <a:ext cx="9795742" cy="2677656"/>
+            <a:ext cx="9795742" cy="1015663"/>
           </a:xfrm>
           <a:prstGeom prst="rect">
             <a:avLst/>
@@ -5033,65 +5034,14 @@
               <a:defRPr/>
             </a:pPr>
             <a:r>
-              <a:rPr lang="en-US" sz="6000" b="1" dirty="0">
-                <a:solidFill>
-                  <a:schemeClr val="bg1"/>
-                </a:solidFill>
-              </a:rPr>
-              <a:t>Experimental:</a:t>
-            </a:r>
-          </a:p>
-          <a:p>
-            <a:pPr marL="0" marR="0" lvl="0" indent="0" defTabSz="914400" rtl="0" eaLnBrk="1" fontAlgn="auto" latinLnBrk="0" hangingPunct="1">
-              <a:lnSpc>
-                <a:spcPct val="100000"/>
-              </a:lnSpc>
-              <a:spcBef>
-                <a:spcPts val="0"/>
-              </a:spcBef>
-              <a:spcAft>
-                <a:spcPts val="0"/>
-              </a:spcAft>
-              <a:buClrTx/>
-              <a:buSzTx/>
-              <a:buFontTx/>
-              <a:buNone/>
-              <a:tabLst/>
-              <a:defRPr/>
-            </a:pPr>
-            <a:endParaRPr lang="en-US" sz="6000" b="1" dirty="0">
-              <a:solidFill>
-                <a:schemeClr val="bg1"/>
-              </a:solidFill>
-            </a:endParaRPr>
-          </a:p>
-          <a:p>
-            <a:pPr marL="0" marR="0" lvl="0" indent="0" defTabSz="914400" rtl="0" eaLnBrk="1" fontAlgn="auto" latinLnBrk="0" hangingPunct="1">
-              <a:lnSpc>
-                <a:spcPct val="100000"/>
-              </a:lnSpc>
-              <a:spcBef>
-                <a:spcPts val="0"/>
-              </a:spcBef>
-              <a:spcAft>
-                <a:spcPts val="0"/>
-              </a:spcAft>
-              <a:buClrTx/>
-              <a:buSzTx/>
-              <a:buFontTx/>
-              <a:buNone/>
-              <a:tabLst/>
-              <a:defRPr/>
-            </a:pPr>
-            <a:r>
-              <a:rPr lang="en-US" sz="4400" dirty="0">
+              <a:rPr lang="en-US" sz="6000" dirty="0">
                 <a:solidFill>
                   <a:schemeClr val="bg1"/>
                 </a:solidFill>
               </a:rPr>
               <a:t>RNN based architecture</a:t>
             </a:r>
-            <a:endParaRPr lang="en-US" sz="4400" b="1" dirty="0">
+            <a:endParaRPr lang="en-US" sz="6000" b="1" dirty="0">
               <a:solidFill>
                 <a:schemeClr val="bg1"/>
               </a:solidFill>
@@ -5182,13 +5132,8 @@
             </a:pPr>
             <a:r>
               <a:rPr lang="en-US" sz="2800" b="1" dirty="0"/>
-              <a:t>Experimental: </a:t>
-            </a:r>
-            <a:r>
-              <a:rPr lang="en-US" sz="2800" dirty="0"/>
               <a:t>RNN based architecture</a:t>
             </a:r>
-            <a:endParaRPr lang="en-US" sz="2800" b="1" dirty="0"/>
           </a:p>
         </p:txBody>
       </p:sp>
@@ -5411,13 +5356,8 @@
             </a:pPr>
             <a:r>
               <a:rPr lang="en-US" sz="2800" b="1" dirty="0"/>
-              <a:t>Experimental: </a:t>
-            </a:r>
-            <a:r>
-              <a:rPr lang="en-US" sz="2800" dirty="0"/>
               <a:t>RNN based architecture</a:t>
             </a:r>
-            <a:endParaRPr lang="en-US" sz="2800" b="1" dirty="0"/>
           </a:p>
         </p:txBody>
       </p:sp>
@@ -5784,13 +5724,8 @@
             </a:pPr>
             <a:r>
               <a:rPr lang="en-US" sz="2800" b="1" dirty="0"/>
-              <a:t>Experimental: </a:t>
-            </a:r>
-            <a:r>
-              <a:rPr lang="en-US" sz="2800" dirty="0"/>
               <a:t>RNN based architecture</a:t>
             </a:r>
-            <a:endParaRPr lang="en-US" sz="2800" b="1" dirty="0"/>
           </a:p>
         </p:txBody>
       </p:sp>
@@ -5822,7 +5757,7 @@
         </p:blipFill>
         <p:spPr>
           <a:xfrm>
-            <a:off x="904048" y="1269280"/>
+            <a:off x="1158573" y="1269280"/>
             <a:ext cx="10080395" cy="5108479"/>
           </a:xfrm>
           <a:prstGeom prst="rect">
@@ -5834,6 +5769,449 @@
     <p:extLst>
       <p:ext uri="{BB962C8B-B14F-4D97-AF65-F5344CB8AC3E}">
         <p14:creationId xmlns:p14="http://schemas.microsoft.com/office/powerpoint/2010/main" val="1115452856"/>
+      </p:ext>
+    </p:extLst>
+  </p:cSld>
+  <p:clrMapOvr>
+    <a:masterClrMapping/>
+  </p:clrMapOvr>
+</p:sld>
+</file>
+
+<file path=ppt/slides/slide6.xml><?xml version="1.0" encoding="utf-8"?>
+<p:sld xmlns:a="http://schemas.openxmlformats.org/drawingml/2006/main" xmlns:r="http://schemas.openxmlformats.org/officeDocument/2006/relationships" xmlns:p="http://schemas.openxmlformats.org/presentationml/2006/main">
+  <p:cSld>
+    <p:spTree>
+      <p:nvGrpSpPr>
+        <p:cNvPr id="1" name="">
+          <a:extLst>
+            <a:ext uri="{FF2B5EF4-FFF2-40B4-BE49-F238E27FC236}">
+              <a16:creationId xmlns:a16="http://schemas.microsoft.com/office/drawing/2014/main" id="{482B54BB-04FB-95F5-8F0F-439E0B357719}"/>
+            </a:ext>
+          </a:extLst>
+        </p:cNvPr>
+        <p:cNvGrpSpPr/>
+        <p:nvPr/>
+      </p:nvGrpSpPr>
+      <p:grpSpPr>
+        <a:xfrm>
+          <a:off x="0" y="0"/>
+          <a:ext cx="0" cy="0"/>
+          <a:chOff x="0" y="0"/>
+          <a:chExt cx="0" cy="0"/>
+        </a:xfrm>
+      </p:grpSpPr>
+      <p:sp>
+        <p:nvSpPr>
+          <p:cNvPr id="2" name="TextBox 1">
+            <a:extLst>
+              <a:ext uri="{FF2B5EF4-FFF2-40B4-BE49-F238E27FC236}">
+                <a16:creationId xmlns:a16="http://schemas.microsoft.com/office/drawing/2014/main" id="{9F9DB97C-62AB-140F-A113-60D50758BD12}"/>
+              </a:ext>
+            </a:extLst>
+          </p:cNvPr>
+          <p:cNvSpPr txBox="1"/>
+          <p:nvPr/>
+        </p:nvSpPr>
+        <p:spPr>
+          <a:xfrm>
+            <a:off x="1198775" y="632641"/>
+            <a:ext cx="9795742" cy="523220"/>
+          </a:xfrm>
+          <a:prstGeom prst="rect">
+            <a:avLst/>
+          </a:prstGeom>
+          <a:noFill/>
+        </p:spPr>
+        <p:txBody>
+          <a:bodyPr wrap="square" rtlCol="0">
+            <a:spAutoFit/>
+          </a:bodyPr>
+          <a:lstStyle/>
+          <a:p>
+            <a:pPr marL="0" marR="0" lvl="0" indent="0" defTabSz="914400" rtl="0" eaLnBrk="1" fontAlgn="auto" latinLnBrk="0" hangingPunct="1">
+              <a:lnSpc>
+                <a:spcPct val="100000"/>
+              </a:lnSpc>
+              <a:spcBef>
+                <a:spcPts val="0"/>
+              </a:spcBef>
+              <a:spcAft>
+                <a:spcPts val="0"/>
+              </a:spcAft>
+              <a:buClrTx/>
+              <a:buSzTx/>
+              <a:buFontTx/>
+              <a:buNone/>
+              <a:tabLst/>
+              <a:defRPr/>
+            </a:pPr>
+            <a:r>
+              <a:rPr lang="en-US" sz="2800" b="1" dirty="0"/>
+              <a:t>RNN based architecture</a:t>
+            </a:r>
+          </a:p>
+        </p:txBody>
+      </p:sp>
+      <p:graphicFrame>
+        <p:nvGraphicFramePr>
+          <p:cNvPr id="8" name="Table 7">
+            <a:extLst>
+              <a:ext uri="{FF2B5EF4-FFF2-40B4-BE49-F238E27FC236}">
+                <a16:creationId xmlns:a16="http://schemas.microsoft.com/office/drawing/2014/main" id="{F756B044-29CB-5E2E-2BE7-81F1E8DB938F}"/>
+              </a:ext>
+            </a:extLst>
+          </p:cNvPr>
+          <p:cNvGraphicFramePr>
+            <a:graphicFrameLocks noGrp="1"/>
+          </p:cNvGraphicFramePr>
+          <p:nvPr>
+            <p:extLst>
+              <p:ext uri="{D42A27DB-BD31-4B8C-83A1-F6EECF244321}">
+                <p14:modId xmlns:p14="http://schemas.microsoft.com/office/powerpoint/2010/main" val="524857916"/>
+              </p:ext>
+            </p:extLst>
+          </p:nvPr>
+        </p:nvGraphicFramePr>
+        <p:xfrm>
+          <a:off x="1942444" y="1737088"/>
+          <a:ext cx="8307111" cy="3383823"/>
+        </p:xfrm>
+        <a:graphic>
+          <a:graphicData uri="http://schemas.openxmlformats.org/drawingml/2006/table">
+            <a:tbl>
+              <a:tblPr firstRow="1" bandRow="1">
+                <a:tableStyleId>{F5AB1C69-6EDB-4FF4-983F-18BD219EF322}</a:tableStyleId>
+              </a:tblPr>
+              <a:tblGrid>
+                <a:gridCol w="4149890">
+                  <a:extLst>
+                    <a:ext uri="{9D8B030D-6E8A-4147-A177-3AD203B41FA5}">
+                      <a16:colId xmlns:a16="http://schemas.microsoft.com/office/drawing/2014/main" val="922800324"/>
+                    </a:ext>
+                  </a:extLst>
+                </a:gridCol>
+                <a:gridCol w="4157221">
+                  <a:extLst>
+                    <a:ext uri="{9D8B030D-6E8A-4147-A177-3AD203B41FA5}">
+                      <a16:colId xmlns:a16="http://schemas.microsoft.com/office/drawing/2014/main" val="2193086636"/>
+                    </a:ext>
+                  </a:extLst>
+                </a:gridCol>
+              </a:tblGrid>
+              <a:tr h="590661">
+                <a:tc gridSpan="2">
+                  <a:txBody>
+                    <a:bodyPr/>
+                    <a:lstStyle/>
+                    <a:p>
+                      <a:pPr algn="ctr"/>
+                      <a:r>
+                        <a:rPr lang="en-US" dirty="0">
+                          <a:solidFill>
+                            <a:schemeClr val="tx1"/>
+                          </a:solidFill>
+                        </a:rPr>
+                        <a:t>Testing: </a:t>
+                      </a:r>
+                      <a:r>
+                        <a:rPr lang="en-US" b="0" dirty="0">
+                          <a:solidFill>
+                            <a:schemeClr val="tx1"/>
+                          </a:solidFill>
+                        </a:rPr>
+                        <a:t>5169 scenes, 500 query points per scene</a:t>
+                      </a:r>
+                    </a:p>
+                  </a:txBody>
+                  <a:tcPr anchor="ctr"/>
+                </a:tc>
+                <a:tc hMerge="1">
+                  <a:txBody>
+                    <a:bodyPr/>
+                    <a:lstStyle/>
+                    <a:p>
+                      <a:endParaRPr lang="en-US"/>
+                    </a:p>
+                  </a:txBody>
+                  <a:tcPr/>
+                </a:tc>
+                <a:extLst>
+                  <a:ext uri="{0D108BD9-81ED-4DB2-BD59-A6C34878D82A}">
+                    <a16:rowId xmlns:a16="http://schemas.microsoft.com/office/drawing/2014/main" val="506672063"/>
+                  </a:ext>
+                </a:extLst>
+              </a:tr>
+              <a:tr h="1055802">
+                <a:tc>
+                  <a:txBody>
+                    <a:bodyPr/>
+                    <a:lstStyle/>
+                    <a:p>
+                      <a:pPr marL="0" marR="0" lvl="0" indent="0" algn="just" defTabSz="914400" rtl="0" eaLnBrk="1" fontAlgn="auto" latinLnBrk="0" hangingPunct="1">
+                        <a:lnSpc>
+                          <a:spcPct val="100000"/>
+                        </a:lnSpc>
+                        <a:spcBef>
+                          <a:spcPts val="0"/>
+                        </a:spcBef>
+                        <a:spcAft>
+                          <a:spcPts val="0"/>
+                        </a:spcAft>
+                        <a:buClrTx/>
+                        <a:buSzTx/>
+                        <a:buFontTx/>
+                        <a:buNone/>
+                        <a:tabLst/>
+                        <a:defRPr/>
+                      </a:pPr>
+                      <a:r>
+                        <a:rPr lang="en-US" sz="1800" b="1" dirty="0"/>
+                        <a:t>Training:</a:t>
+                      </a:r>
+                      <a:r>
+                        <a:rPr lang="en-US" sz="1800" dirty="0"/>
+                        <a:t> 3569 scenes, </a:t>
+                      </a:r>
+                    </a:p>
+                    <a:p>
+                      <a:pPr marL="0" marR="0" lvl="0" indent="0" algn="just" defTabSz="914400" rtl="0" eaLnBrk="1" fontAlgn="auto" latinLnBrk="0" hangingPunct="1">
+                        <a:lnSpc>
+                          <a:spcPct val="100000"/>
+                        </a:lnSpc>
+                        <a:spcBef>
+                          <a:spcPts val="0"/>
+                        </a:spcBef>
+                        <a:spcAft>
+                          <a:spcPts val="0"/>
+                        </a:spcAft>
+                        <a:buClrTx/>
+                        <a:buSzTx/>
+                        <a:buFontTx/>
+                        <a:buNone/>
+                        <a:tabLst/>
+                        <a:defRPr/>
+                      </a:pPr>
+                      <a:r>
+                        <a:rPr lang="en-US" sz="1800" dirty="0"/>
+                        <a:t>                    500 query pairs per scene,  </a:t>
+                      </a:r>
+                    </a:p>
+                    <a:p>
+                      <a:pPr marL="0" marR="0" lvl="0" indent="0" algn="just" defTabSz="914400" rtl="0" eaLnBrk="1" fontAlgn="auto" latinLnBrk="0" hangingPunct="1">
+                        <a:lnSpc>
+                          <a:spcPct val="100000"/>
+                        </a:lnSpc>
+                        <a:spcBef>
+                          <a:spcPts val="0"/>
+                        </a:spcBef>
+                        <a:spcAft>
+                          <a:spcPts val="0"/>
+                        </a:spcAft>
+                        <a:buClrTx/>
+                        <a:buSzTx/>
+                        <a:buFontTx/>
+                        <a:buNone/>
+                        <a:tabLst/>
+                        <a:defRPr/>
+                      </a:pPr>
+                      <a:r>
+                        <a:rPr lang="en-US" sz="1800" dirty="0"/>
+                        <a:t>                    15 epoch</a:t>
+                      </a:r>
+                      <a:endParaRPr lang="en-US" dirty="0"/>
+                    </a:p>
+                  </a:txBody>
+                  <a:tcPr anchor="ctr"/>
+                </a:tc>
+                <a:tc>
+                  <a:txBody>
+                    <a:bodyPr/>
+                    <a:lstStyle/>
+                    <a:p>
+                      <a:pPr marL="0" marR="0" lvl="0" indent="0" algn="just" defTabSz="914400" rtl="0" eaLnBrk="1" fontAlgn="auto" latinLnBrk="0" hangingPunct="1">
+                        <a:lnSpc>
+                          <a:spcPct val="100000"/>
+                        </a:lnSpc>
+                        <a:spcBef>
+                          <a:spcPts val="0"/>
+                        </a:spcBef>
+                        <a:spcAft>
+                          <a:spcPts val="0"/>
+                        </a:spcAft>
+                        <a:buClrTx/>
+                        <a:buSzTx/>
+                        <a:buFontTx/>
+                        <a:buNone/>
+                        <a:tabLst/>
+                        <a:defRPr/>
+                      </a:pPr>
+                      <a:r>
+                        <a:rPr lang="en-US" sz="1800" b="1" dirty="0"/>
+                        <a:t>Training:</a:t>
+                      </a:r>
+                      <a:r>
+                        <a:rPr lang="en-US" sz="1800" dirty="0"/>
+                        <a:t> 6169 scenes, </a:t>
+                      </a:r>
+                    </a:p>
+                    <a:p>
+                      <a:pPr marL="0" marR="0" lvl="0" indent="0" algn="just" defTabSz="914400" rtl="0" eaLnBrk="1" fontAlgn="auto" latinLnBrk="0" hangingPunct="1">
+                        <a:lnSpc>
+                          <a:spcPct val="100000"/>
+                        </a:lnSpc>
+                        <a:spcBef>
+                          <a:spcPts val="0"/>
+                        </a:spcBef>
+                        <a:spcAft>
+                          <a:spcPts val="0"/>
+                        </a:spcAft>
+                        <a:buClrTx/>
+                        <a:buSzTx/>
+                        <a:buFontTx/>
+                        <a:buNone/>
+                        <a:tabLst/>
+                        <a:defRPr/>
+                      </a:pPr>
+                      <a:r>
+                        <a:rPr lang="en-US" sz="1800" dirty="0"/>
+                        <a:t>                    500 query pairs per scene,  </a:t>
+                      </a:r>
+                    </a:p>
+                    <a:p>
+                      <a:pPr marL="0" marR="0" lvl="0" indent="0" algn="just" defTabSz="914400" rtl="0" eaLnBrk="1" fontAlgn="auto" latinLnBrk="0" hangingPunct="1">
+                        <a:lnSpc>
+                          <a:spcPct val="100000"/>
+                        </a:lnSpc>
+                        <a:spcBef>
+                          <a:spcPts val="0"/>
+                        </a:spcBef>
+                        <a:spcAft>
+                          <a:spcPts val="0"/>
+                        </a:spcAft>
+                        <a:buClrTx/>
+                        <a:buSzTx/>
+                        <a:buFontTx/>
+                        <a:buNone/>
+                        <a:tabLst/>
+                        <a:defRPr/>
+                      </a:pPr>
+                      <a:r>
+                        <a:rPr lang="en-US" sz="1800" dirty="0"/>
+                        <a:t>                    6 epoch</a:t>
+                      </a:r>
+                      <a:endParaRPr lang="en-US" dirty="0"/>
+                    </a:p>
+                  </a:txBody>
+                  <a:tcPr anchor="ctr"/>
+                </a:tc>
+                <a:extLst>
+                  <a:ext uri="{0D108BD9-81ED-4DB2-BD59-A6C34878D82A}">
+                    <a16:rowId xmlns:a16="http://schemas.microsoft.com/office/drawing/2014/main" val="1854569102"/>
+                  </a:ext>
+                </a:extLst>
+              </a:tr>
+              <a:tr h="1165790">
+                <a:tc>
+                  <a:txBody>
+                    <a:bodyPr/>
+                    <a:lstStyle/>
+                    <a:p>
+                      <a:r>
+                        <a:rPr lang="en-US" dirty="0"/>
+                        <a:t>Test Loss: 0.3211  </a:t>
+                      </a:r>
+                    </a:p>
+                    <a:p>
+                      <a:r>
+                        <a:rPr lang="en-US" dirty="0"/>
+                        <a:t>Test Accuracy: 0.8556  </a:t>
+                      </a:r>
+                    </a:p>
+                    <a:p>
+                      <a:r>
+                        <a:rPr lang="en-US" dirty="0"/>
+                        <a:t>Test Precision: 0.8968  </a:t>
+                      </a:r>
+                    </a:p>
+                    <a:p>
+                      <a:r>
+                        <a:rPr lang="en-US" dirty="0"/>
+                        <a:t>Test Recall: 0.8437  </a:t>
+                      </a:r>
+                    </a:p>
+                    <a:p>
+                      <a:r>
+                        <a:rPr lang="en-US" dirty="0"/>
+                        <a:t>Test Specificity: 0.8713  </a:t>
+                      </a:r>
+                    </a:p>
+                    <a:p>
+                      <a:r>
+                        <a:rPr lang="en-US" dirty="0"/>
+                        <a:t>Test F1: 0.8694  </a:t>
+                      </a:r>
+                    </a:p>
+                  </a:txBody>
+                  <a:tcPr anchor="ctr"/>
+                </a:tc>
+                <a:tc>
+                  <a:txBody>
+                    <a:bodyPr/>
+                    <a:lstStyle/>
+                    <a:p>
+                      <a:r>
+                        <a:rPr lang="en-US" dirty="0"/>
+                        <a:t>Test Loss: 0.3222  </a:t>
+                      </a:r>
+                    </a:p>
+                    <a:p>
+                      <a:r>
+                        <a:rPr lang="en-US" dirty="0"/>
+                        <a:t>Test Accuracy: 0.8563  </a:t>
+                      </a:r>
+                    </a:p>
+                    <a:p>
+                      <a:r>
+                        <a:rPr lang="en-US" dirty="0"/>
+                        <a:t>Test Precision: 0.9138  </a:t>
+                      </a:r>
+                    </a:p>
+                    <a:p>
+                      <a:r>
+                        <a:rPr lang="en-US" dirty="0"/>
+                        <a:t>Test Recall: 0.8257  </a:t>
+                      </a:r>
+                    </a:p>
+                    <a:p>
+                      <a:r>
+                        <a:rPr lang="en-US" dirty="0"/>
+                        <a:t>Test Specificity: 0.8968  </a:t>
+                      </a:r>
+                    </a:p>
+                    <a:p>
+                      <a:r>
+                        <a:rPr lang="en-US" dirty="0"/>
+                        <a:t>Test F1: 0.8675 </a:t>
+                      </a:r>
+                    </a:p>
+                  </a:txBody>
+                  <a:tcPr anchor="ctr"/>
+                </a:tc>
+                <a:extLst>
+                  <a:ext uri="{0D108BD9-81ED-4DB2-BD59-A6C34878D82A}">
+                    <a16:rowId xmlns:a16="http://schemas.microsoft.com/office/drawing/2014/main" val="1915227928"/>
+                  </a:ext>
+                </a:extLst>
+              </a:tr>
+            </a:tbl>
+          </a:graphicData>
+        </a:graphic>
+      </p:graphicFrame>
+    </p:spTree>
+    <p:extLst>
+      <p:ext uri="{BB962C8B-B14F-4D97-AF65-F5344CB8AC3E}">
+        <p14:creationId xmlns:p14="http://schemas.microsoft.com/office/powerpoint/2010/main" val="3887707763"/>
       </p:ext>
     </p:extLst>
   </p:cSld>

</xml_diff>